<commit_message>
Update Dapr setup image
</commit_message>
<xml_diff>
--- a/dapr TrafficControl Figures.pptx
+++ b/dapr TrafficControl Figures.pptx
@@ -201,7 +201,7 @@
           <a:p>
             <a:fld id="{1AB37C8C-570C-44BF-9200-8D3EB7BB4480}" type="datetimeFigureOut">
               <a:rPr lang="nl-NL" smtClean="0"/>
-              <a:t>24-9-2020</a:t>
+              <a:t>26-11-2020</a:t>
             </a:fld>
             <a:endParaRPr lang="nl-NL"/>
           </a:p>
@@ -702,7 +702,7 @@
           <a:p>
             <a:fld id="{705B85CB-7326-4CDB-B6DC-66899E5F8844}" type="datetimeFigureOut">
               <a:rPr lang="nl-NL" smtClean="0"/>
-              <a:t>24-9-2020</a:t>
+              <a:t>26-11-2020</a:t>
             </a:fld>
             <a:endParaRPr lang="nl-NL"/>
           </a:p>
@@ -902,7 +902,7 @@
           <a:p>
             <a:fld id="{705B85CB-7326-4CDB-B6DC-66899E5F8844}" type="datetimeFigureOut">
               <a:rPr lang="nl-NL" smtClean="0"/>
-              <a:t>24-9-2020</a:t>
+              <a:t>26-11-2020</a:t>
             </a:fld>
             <a:endParaRPr lang="nl-NL"/>
           </a:p>
@@ -1112,7 +1112,7 @@
           <a:p>
             <a:fld id="{705B85CB-7326-4CDB-B6DC-66899E5F8844}" type="datetimeFigureOut">
               <a:rPr lang="nl-NL" smtClean="0"/>
-              <a:t>24-9-2020</a:t>
+              <a:t>26-11-2020</a:t>
             </a:fld>
             <a:endParaRPr lang="nl-NL"/>
           </a:p>
@@ -1312,7 +1312,7 @@
           <a:p>
             <a:fld id="{705B85CB-7326-4CDB-B6DC-66899E5F8844}" type="datetimeFigureOut">
               <a:rPr lang="nl-NL" smtClean="0"/>
-              <a:t>24-9-2020</a:t>
+              <a:t>26-11-2020</a:t>
             </a:fld>
             <a:endParaRPr lang="nl-NL"/>
           </a:p>
@@ -1588,7 +1588,7 @@
           <a:p>
             <a:fld id="{705B85CB-7326-4CDB-B6DC-66899E5F8844}" type="datetimeFigureOut">
               <a:rPr lang="nl-NL" smtClean="0"/>
-              <a:t>24-9-2020</a:t>
+              <a:t>26-11-2020</a:t>
             </a:fld>
             <a:endParaRPr lang="nl-NL"/>
           </a:p>
@@ -1856,7 +1856,7 @@
           <a:p>
             <a:fld id="{705B85CB-7326-4CDB-B6DC-66899E5F8844}" type="datetimeFigureOut">
               <a:rPr lang="nl-NL" smtClean="0"/>
-              <a:t>24-9-2020</a:t>
+              <a:t>26-11-2020</a:t>
             </a:fld>
             <a:endParaRPr lang="nl-NL"/>
           </a:p>
@@ -2271,7 +2271,7 @@
           <a:p>
             <a:fld id="{705B85CB-7326-4CDB-B6DC-66899E5F8844}" type="datetimeFigureOut">
               <a:rPr lang="nl-NL" smtClean="0"/>
-              <a:t>24-9-2020</a:t>
+              <a:t>26-11-2020</a:t>
             </a:fld>
             <a:endParaRPr lang="nl-NL"/>
           </a:p>
@@ -2413,7 +2413,7 @@
           <a:p>
             <a:fld id="{705B85CB-7326-4CDB-B6DC-66899E5F8844}" type="datetimeFigureOut">
               <a:rPr lang="nl-NL" smtClean="0"/>
-              <a:t>24-9-2020</a:t>
+              <a:t>26-11-2020</a:t>
             </a:fld>
             <a:endParaRPr lang="nl-NL"/>
           </a:p>
@@ -2526,7 +2526,7 @@
           <a:p>
             <a:fld id="{705B85CB-7326-4CDB-B6DC-66899E5F8844}" type="datetimeFigureOut">
               <a:rPr lang="nl-NL" smtClean="0"/>
-              <a:t>24-9-2020</a:t>
+              <a:t>26-11-2020</a:t>
             </a:fld>
             <a:endParaRPr lang="nl-NL"/>
           </a:p>
@@ -2839,7 +2839,7 @@
           <a:p>
             <a:fld id="{705B85CB-7326-4CDB-B6DC-66899E5F8844}" type="datetimeFigureOut">
               <a:rPr lang="nl-NL" smtClean="0"/>
-              <a:t>24-9-2020</a:t>
+              <a:t>26-11-2020</a:t>
             </a:fld>
             <a:endParaRPr lang="nl-NL"/>
           </a:p>
@@ -3128,7 +3128,7 @@
           <a:p>
             <a:fld id="{705B85CB-7326-4CDB-B6DC-66899E5F8844}" type="datetimeFigureOut">
               <a:rPr lang="nl-NL" smtClean="0"/>
-              <a:t>24-9-2020</a:t>
+              <a:t>26-11-2020</a:t>
             </a:fld>
             <a:endParaRPr lang="nl-NL"/>
           </a:p>
@@ -3371,7 +3371,7 @@
           <a:p>
             <a:fld id="{705B85CB-7326-4CDB-B6DC-66899E5F8844}" type="datetimeFigureOut">
               <a:rPr lang="nl-NL" smtClean="0"/>
-              <a:t>24-9-2020</a:t>
+              <a:t>26-11-2020</a:t>
             </a:fld>
             <a:endParaRPr lang="nl-NL"/>
           </a:p>
@@ -10179,8 +10179,8 @@
         </p:nvSpPr>
         <p:spPr>
           <a:xfrm>
-            <a:off x="613458" y="1724628"/>
-            <a:ext cx="10301469" cy="3865944"/>
+            <a:off x="613458" y="1275127"/>
+            <a:ext cx="10301469" cy="4315445"/>
           </a:xfrm>
           <a:prstGeom prst="rect">
             <a:avLst/>
@@ -10231,8 +10231,8 @@
         </p:nvSpPr>
         <p:spPr>
           <a:xfrm>
-            <a:off x="4075604" y="4983123"/>
-            <a:ext cx="3189678" cy="485895"/>
+            <a:off x="3150953" y="4862335"/>
+            <a:ext cx="5001285" cy="485895"/>
           </a:xfrm>
           <a:prstGeom prst="roundRect">
             <a:avLst/>
@@ -10959,6 +10959,7 @@
             </a:extLst>
           </p:cNvPr>
           <p:cNvCxnSpPr>
+            <a:cxnSpLocks/>
             <a:stCxn id="59" idx="3"/>
             <a:endCxn id="49" idx="1"/>
           </p:cNvCxnSpPr>
@@ -11051,16 +11052,17 @@
           </p:cNvPr>
           <p:cNvCxnSpPr>
             <a:cxnSpLocks/>
-            <a:stCxn id="48" idx="2"/>
+            <a:stCxn id="49" idx="2"/>
+            <a:endCxn id="50" idx="0"/>
           </p:cNvCxnSpPr>
           <p:nvPr/>
         </p:nvCxnSpPr>
         <p:spPr>
-          <a:xfrm rot="16200000" flipH="1">
-            <a:off x="4889872" y="2344671"/>
-            <a:ext cx="699857" cy="3426307"/>
-          </a:xfrm>
-          <a:prstGeom prst="bentConnector2">
+          <a:xfrm>
+            <a:off x="7450998" y="2789862"/>
+            <a:ext cx="0" cy="846459"/>
+          </a:xfrm>
+          <a:prstGeom prst="straightConnector1">
             <a:avLst/>
           </a:prstGeom>
           <a:ln w="19050">
@@ -11099,7 +11101,7 @@
         </p:nvSpPr>
         <p:spPr>
           <a:xfrm>
-            <a:off x="4324164" y="4283265"/>
+            <a:off x="7329807" y="3041656"/>
             <a:ext cx="248978" cy="248978"/>
           </a:xfrm>
           <a:prstGeom prst="ellipse">
@@ -11328,7 +11330,7 @@
         </p:nvSpPr>
         <p:spPr>
           <a:xfrm>
-            <a:off x="4236514" y="5120961"/>
+            <a:off x="3311864" y="5000173"/>
             <a:ext cx="248978" cy="248978"/>
           </a:xfrm>
           <a:prstGeom prst="ellipse">
@@ -11384,7 +11386,7 @@
         </p:nvSpPr>
         <p:spPr>
           <a:xfrm>
-            <a:off x="5346460" y="5124247"/>
+            <a:off x="4421810" y="5003459"/>
             <a:ext cx="248978" cy="248978"/>
           </a:xfrm>
           <a:prstGeom prst="ellipse">
@@ -11440,7 +11442,7 @@
         </p:nvSpPr>
         <p:spPr>
           <a:xfrm>
-            <a:off x="4485492" y="5085157"/>
+            <a:off x="3560842" y="4964369"/>
             <a:ext cx="1527089" cy="307777"/>
           </a:xfrm>
           <a:prstGeom prst="rect">
@@ -11476,7 +11478,7 @@
         </p:nvSpPr>
         <p:spPr>
           <a:xfrm>
-            <a:off x="5595438" y="5085157"/>
+            <a:off x="4670788" y="4964369"/>
             <a:ext cx="1527089" cy="307777"/>
           </a:xfrm>
           <a:prstGeom prst="rect">
@@ -11537,6 +11539,202 @@
           </a:prstGeom>
         </p:spPr>
       </p:pic>
+      <p:cxnSp>
+        <p:nvCxnSpPr>
+          <p:cNvPr id="35" name="Connector: Elbow 34">
+            <a:extLst>
+              <a:ext uri="{FF2B5EF4-FFF2-40B4-BE49-F238E27FC236}">
+                <a16:creationId xmlns:a16="http://schemas.microsoft.com/office/drawing/2014/main" id="{63927320-F937-4447-B093-87D31B565EF4}"/>
+              </a:ext>
+            </a:extLst>
+          </p:cNvPr>
+          <p:cNvCxnSpPr>
+            <a:cxnSpLocks/>
+            <a:stCxn id="49" idx="0"/>
+            <a:endCxn id="59" idx="0"/>
+          </p:cNvCxnSpPr>
+          <p:nvPr/>
+        </p:nvCxnSpPr>
+        <p:spPr>
+          <a:xfrm rot="16200000" flipH="1" flipV="1">
+            <a:off x="6025893" y="1299119"/>
+            <a:ext cx="918035" cy="1932175"/>
+          </a:xfrm>
+          <a:prstGeom prst="bentConnector3">
+            <a:avLst>
+              <a:gd name="adj1" fmla="val -24901"/>
+            </a:avLst>
+          </a:prstGeom>
+          <a:ln w="19050">
+            <a:solidFill>
+              <a:schemeClr val="tx1"/>
+            </a:solidFill>
+            <a:tailEnd type="triangle"/>
+          </a:ln>
+        </p:spPr>
+        <p:style>
+          <a:lnRef idx="1">
+            <a:schemeClr val="accent1"/>
+          </a:lnRef>
+          <a:fillRef idx="0">
+            <a:schemeClr val="accent1"/>
+          </a:fillRef>
+          <a:effectRef idx="0">
+            <a:schemeClr val="accent1"/>
+          </a:effectRef>
+          <a:fontRef idx="minor">
+            <a:schemeClr val="tx1"/>
+          </a:fontRef>
+        </p:style>
+      </p:cxnSp>
+      <p:sp>
+        <p:nvSpPr>
+          <p:cNvPr id="38" name="Oval 37">
+            <a:extLst>
+              <a:ext uri="{FF2B5EF4-FFF2-40B4-BE49-F238E27FC236}">
+                <a16:creationId xmlns:a16="http://schemas.microsoft.com/office/drawing/2014/main" id="{603F87CB-AA8A-4B99-8D1D-9F408182FFFD}"/>
+              </a:ext>
+            </a:extLst>
+          </p:cNvPr>
+          <p:cNvSpPr/>
+          <p:nvPr/>
+        </p:nvSpPr>
+        <p:spPr>
+          <a:xfrm>
+            <a:off x="6358982" y="1436288"/>
+            <a:ext cx="248978" cy="248978"/>
+          </a:xfrm>
+          <a:prstGeom prst="ellipse">
+            <a:avLst/>
+          </a:prstGeom>
+          <a:solidFill>
+            <a:schemeClr val="tx1"/>
+          </a:solidFill>
+          <a:ln>
+            <a:noFill/>
+          </a:ln>
+        </p:spPr>
+        <p:style>
+          <a:lnRef idx="2">
+            <a:schemeClr val="accent1">
+              <a:shade val="50000"/>
+            </a:schemeClr>
+          </a:lnRef>
+          <a:fillRef idx="1">
+            <a:schemeClr val="accent1"/>
+          </a:fillRef>
+          <a:effectRef idx="0">
+            <a:schemeClr val="accent1"/>
+          </a:effectRef>
+          <a:fontRef idx="minor">
+            <a:schemeClr val="lt1"/>
+          </a:fontRef>
+        </p:style>
+        <p:txBody>
+          <a:bodyPr rtlCol="0" anchor="ctr"/>
+          <a:lstStyle/>
+          <a:p>
+            <a:pPr algn="ctr"/>
+            <a:r>
+              <a:rPr lang="nl-NL" sz="1200" dirty="0"/>
+              <a:t>3</a:t>
+            </a:r>
+            <a:endParaRPr lang="en-US" sz="1200" dirty="0"/>
+          </a:p>
+        </p:txBody>
+      </p:sp>
+      <p:sp>
+        <p:nvSpPr>
+          <p:cNvPr id="39" name="Oval 38">
+            <a:extLst>
+              <a:ext uri="{FF2B5EF4-FFF2-40B4-BE49-F238E27FC236}">
+                <a16:creationId xmlns:a16="http://schemas.microsoft.com/office/drawing/2014/main" id="{000410CB-51D7-46EE-9FCF-BCC6898A2192}"/>
+              </a:ext>
+            </a:extLst>
+          </p:cNvPr>
+          <p:cNvSpPr/>
+          <p:nvPr/>
+        </p:nvSpPr>
+        <p:spPr>
+          <a:xfrm>
+            <a:off x="6197877" y="5000173"/>
+            <a:ext cx="248978" cy="248978"/>
+          </a:xfrm>
+          <a:prstGeom prst="ellipse">
+            <a:avLst/>
+          </a:prstGeom>
+          <a:solidFill>
+            <a:schemeClr val="tx1"/>
+          </a:solidFill>
+          <a:ln>
+            <a:noFill/>
+          </a:ln>
+        </p:spPr>
+        <p:style>
+          <a:lnRef idx="2">
+            <a:schemeClr val="accent1">
+              <a:shade val="50000"/>
+            </a:schemeClr>
+          </a:lnRef>
+          <a:fillRef idx="1">
+            <a:schemeClr val="accent1"/>
+          </a:fillRef>
+          <a:effectRef idx="0">
+            <a:schemeClr val="accent1"/>
+          </a:effectRef>
+          <a:fontRef idx="minor">
+            <a:schemeClr val="lt1"/>
+          </a:fontRef>
+        </p:style>
+        <p:txBody>
+          <a:bodyPr rtlCol="0" anchor="ctr"/>
+          <a:lstStyle/>
+          <a:p>
+            <a:pPr algn="ctr"/>
+            <a:r>
+              <a:rPr lang="nl-NL" sz="1200" dirty="0"/>
+              <a:t>3</a:t>
+            </a:r>
+            <a:endParaRPr lang="en-US" sz="1200" dirty="0"/>
+          </a:p>
+        </p:txBody>
+      </p:sp>
+      <p:sp>
+        <p:nvSpPr>
+          <p:cNvPr id="40" name="TextBox 39">
+            <a:extLst>
+              <a:ext uri="{FF2B5EF4-FFF2-40B4-BE49-F238E27FC236}">
+                <a16:creationId xmlns:a16="http://schemas.microsoft.com/office/drawing/2014/main" id="{867756B0-33C1-4E59-8188-C31DB2CFDF7D}"/>
+              </a:ext>
+            </a:extLst>
+          </p:cNvPr>
+          <p:cNvSpPr txBox="1"/>
+          <p:nvPr/>
+        </p:nvSpPr>
+        <p:spPr>
+          <a:xfrm>
+            <a:off x="6464043" y="4964369"/>
+            <a:ext cx="1807254" cy="307777"/>
+          </a:xfrm>
+          <a:prstGeom prst="rect">
+            <a:avLst/>
+          </a:prstGeom>
+          <a:noFill/>
+        </p:spPr>
+        <p:txBody>
+          <a:bodyPr wrap="square" rtlCol="0">
+            <a:spAutoFit/>
+          </a:bodyPr>
+          <a:lstStyle/>
+          <a:p>
+            <a:r>
+              <a:rPr lang="nl-NL" sz="1400" dirty="0"/>
+              <a:t>State Management</a:t>
+            </a:r>
+            <a:endParaRPr lang="en-US" sz="1400" dirty="0"/>
+          </a:p>
+        </p:txBody>
+      </p:sp>
     </p:spTree>
     <p:extLst>
       <p:ext uri="{BB962C8B-B14F-4D97-AF65-F5344CB8AC3E}">

</xml_diff>

<commit_message>
Update to Dapr RC2
</commit_message>
<xml_diff>
--- a/dapr TrafficControl Figures.pptx
+++ b/dapr TrafficControl Figures.pptx
@@ -201,7 +201,7 @@
           <a:p>
             <a:fld id="{1AB37C8C-570C-44BF-9200-8D3EB7BB4480}" type="datetimeFigureOut">
               <a:rPr lang="nl-NL" smtClean="0"/>
-              <a:t>26-11-2020</a:t>
+              <a:t>13-1-2021</a:t>
             </a:fld>
             <a:endParaRPr lang="nl-NL"/>
           </a:p>
@@ -702,7 +702,7 @@
           <a:p>
             <a:fld id="{705B85CB-7326-4CDB-B6DC-66899E5F8844}" type="datetimeFigureOut">
               <a:rPr lang="nl-NL" smtClean="0"/>
-              <a:t>26-11-2020</a:t>
+              <a:t>13-1-2021</a:t>
             </a:fld>
             <a:endParaRPr lang="nl-NL"/>
           </a:p>
@@ -902,7 +902,7 @@
           <a:p>
             <a:fld id="{705B85CB-7326-4CDB-B6DC-66899E5F8844}" type="datetimeFigureOut">
               <a:rPr lang="nl-NL" smtClean="0"/>
-              <a:t>26-11-2020</a:t>
+              <a:t>13-1-2021</a:t>
             </a:fld>
             <a:endParaRPr lang="nl-NL"/>
           </a:p>
@@ -1112,7 +1112,7 @@
           <a:p>
             <a:fld id="{705B85CB-7326-4CDB-B6DC-66899E5F8844}" type="datetimeFigureOut">
               <a:rPr lang="nl-NL" smtClean="0"/>
-              <a:t>26-11-2020</a:t>
+              <a:t>13-1-2021</a:t>
             </a:fld>
             <a:endParaRPr lang="nl-NL"/>
           </a:p>
@@ -1312,7 +1312,7 @@
           <a:p>
             <a:fld id="{705B85CB-7326-4CDB-B6DC-66899E5F8844}" type="datetimeFigureOut">
               <a:rPr lang="nl-NL" smtClean="0"/>
-              <a:t>26-11-2020</a:t>
+              <a:t>13-1-2021</a:t>
             </a:fld>
             <a:endParaRPr lang="nl-NL"/>
           </a:p>
@@ -1588,7 +1588,7 @@
           <a:p>
             <a:fld id="{705B85CB-7326-4CDB-B6DC-66899E5F8844}" type="datetimeFigureOut">
               <a:rPr lang="nl-NL" smtClean="0"/>
-              <a:t>26-11-2020</a:t>
+              <a:t>13-1-2021</a:t>
             </a:fld>
             <a:endParaRPr lang="nl-NL"/>
           </a:p>
@@ -1856,7 +1856,7 @@
           <a:p>
             <a:fld id="{705B85CB-7326-4CDB-B6DC-66899E5F8844}" type="datetimeFigureOut">
               <a:rPr lang="nl-NL" smtClean="0"/>
-              <a:t>26-11-2020</a:t>
+              <a:t>13-1-2021</a:t>
             </a:fld>
             <a:endParaRPr lang="nl-NL"/>
           </a:p>
@@ -2271,7 +2271,7 @@
           <a:p>
             <a:fld id="{705B85CB-7326-4CDB-B6DC-66899E5F8844}" type="datetimeFigureOut">
               <a:rPr lang="nl-NL" smtClean="0"/>
-              <a:t>26-11-2020</a:t>
+              <a:t>13-1-2021</a:t>
             </a:fld>
             <a:endParaRPr lang="nl-NL"/>
           </a:p>
@@ -2413,7 +2413,7 @@
           <a:p>
             <a:fld id="{705B85CB-7326-4CDB-B6DC-66899E5F8844}" type="datetimeFigureOut">
               <a:rPr lang="nl-NL" smtClean="0"/>
-              <a:t>26-11-2020</a:t>
+              <a:t>13-1-2021</a:t>
             </a:fld>
             <a:endParaRPr lang="nl-NL"/>
           </a:p>
@@ -2526,7 +2526,7 @@
           <a:p>
             <a:fld id="{705B85CB-7326-4CDB-B6DC-66899E5F8844}" type="datetimeFigureOut">
               <a:rPr lang="nl-NL" smtClean="0"/>
-              <a:t>26-11-2020</a:t>
+              <a:t>13-1-2021</a:t>
             </a:fld>
             <a:endParaRPr lang="nl-NL"/>
           </a:p>
@@ -2839,7 +2839,7 @@
           <a:p>
             <a:fld id="{705B85CB-7326-4CDB-B6DC-66899E5F8844}" type="datetimeFigureOut">
               <a:rPr lang="nl-NL" smtClean="0"/>
-              <a:t>26-11-2020</a:t>
+              <a:t>13-1-2021</a:t>
             </a:fld>
             <a:endParaRPr lang="nl-NL"/>
           </a:p>
@@ -3128,7 +3128,7 @@
           <a:p>
             <a:fld id="{705B85CB-7326-4CDB-B6DC-66899E5F8844}" type="datetimeFigureOut">
               <a:rPr lang="nl-NL" smtClean="0"/>
-              <a:t>26-11-2020</a:t>
+              <a:t>13-1-2021</a:t>
             </a:fld>
             <a:endParaRPr lang="nl-NL"/>
           </a:p>
@@ -3371,7 +3371,7 @@
           <a:p>
             <a:fld id="{705B85CB-7326-4CDB-B6DC-66899E5F8844}" type="datetimeFigureOut">
               <a:rPr lang="nl-NL" smtClean="0"/>
-              <a:t>26-11-2020</a:t>
+              <a:t>13-1-2021</a:t>
             </a:fld>
             <a:endParaRPr lang="nl-NL"/>
           </a:p>
@@ -11732,6 +11732,118 @@
               <a:t>State Management</a:t>
             </a:r>
             <a:endParaRPr lang="en-US" sz="1400" dirty="0"/>
+          </a:p>
+        </p:txBody>
+      </p:sp>
+      <p:sp>
+        <p:nvSpPr>
+          <p:cNvPr id="33" name="Oval 32">
+            <a:extLst>
+              <a:ext uri="{FF2B5EF4-FFF2-40B4-BE49-F238E27FC236}">
+                <a16:creationId xmlns:a16="http://schemas.microsoft.com/office/drawing/2014/main" id="{DFC5C278-B8C3-4150-A40C-4F819EE9E79F}"/>
+              </a:ext>
+            </a:extLst>
+          </p:cNvPr>
+          <p:cNvSpPr/>
+          <p:nvPr/>
+        </p:nvSpPr>
+        <p:spPr>
+          <a:xfrm>
+            <a:off x="6358982" y="2629495"/>
+            <a:ext cx="248978" cy="248978"/>
+          </a:xfrm>
+          <a:prstGeom prst="ellipse">
+            <a:avLst/>
+          </a:prstGeom>
+          <a:solidFill>
+            <a:schemeClr val="tx1"/>
+          </a:solidFill>
+          <a:ln>
+            <a:noFill/>
+          </a:ln>
+        </p:spPr>
+        <p:style>
+          <a:lnRef idx="2">
+            <a:schemeClr val="accent1">
+              <a:shade val="50000"/>
+            </a:schemeClr>
+          </a:lnRef>
+          <a:fillRef idx="1">
+            <a:schemeClr val="accent1"/>
+          </a:fillRef>
+          <a:effectRef idx="0">
+            <a:schemeClr val="accent1"/>
+          </a:effectRef>
+          <a:fontRef idx="minor">
+            <a:schemeClr val="lt1"/>
+          </a:fontRef>
+        </p:style>
+        <p:txBody>
+          <a:bodyPr rtlCol="0" anchor="ctr"/>
+          <a:lstStyle/>
+          <a:p>
+            <a:pPr algn="ctr"/>
+            <a:r>
+              <a:rPr lang="nl-NL" sz="1200" dirty="0"/>
+              <a:t>1</a:t>
+            </a:r>
+            <a:endParaRPr lang="en-US" sz="1200" dirty="0"/>
+          </a:p>
+        </p:txBody>
+      </p:sp>
+      <p:sp>
+        <p:nvSpPr>
+          <p:cNvPr id="34" name="Oval 33">
+            <a:extLst>
+              <a:ext uri="{FF2B5EF4-FFF2-40B4-BE49-F238E27FC236}">
+                <a16:creationId xmlns:a16="http://schemas.microsoft.com/office/drawing/2014/main" id="{13D77A00-AC5D-45E2-9492-CAEFDF878A96}"/>
+              </a:ext>
+            </a:extLst>
+          </p:cNvPr>
+          <p:cNvSpPr/>
+          <p:nvPr/>
+        </p:nvSpPr>
+        <p:spPr>
+          <a:xfrm>
+            <a:off x="6358982" y="3502799"/>
+            <a:ext cx="248978" cy="248978"/>
+          </a:xfrm>
+          <a:prstGeom prst="ellipse">
+            <a:avLst/>
+          </a:prstGeom>
+          <a:solidFill>
+            <a:schemeClr val="tx1"/>
+          </a:solidFill>
+          <a:ln>
+            <a:noFill/>
+          </a:ln>
+        </p:spPr>
+        <p:style>
+          <a:lnRef idx="2">
+            <a:schemeClr val="accent1">
+              <a:shade val="50000"/>
+            </a:schemeClr>
+          </a:lnRef>
+          <a:fillRef idx="1">
+            <a:schemeClr val="accent1"/>
+          </a:fillRef>
+          <a:effectRef idx="0">
+            <a:schemeClr val="accent1"/>
+          </a:effectRef>
+          <a:fontRef idx="minor">
+            <a:schemeClr val="lt1"/>
+          </a:fontRef>
+        </p:style>
+        <p:txBody>
+          <a:bodyPr rtlCol="0" anchor="ctr"/>
+          <a:lstStyle/>
+          <a:p>
+            <a:pPr algn="ctr"/>
+            <a:r>
+              <a:rPr lang="nl-NL" sz="1200" dirty="0"/>
+              <a:t>1</a:t>
+            </a:r>
+            <a:endParaRPr lang="en-US" sz="1200" dirty="0"/>
           </a:p>
         </p:txBody>
       </p:sp>

</xml_diff>